<commit_message>
restored python101.py and updated Git101.pptx
</commit_message>
<xml_diff>
--- a/Git101.pptx
+++ b/Git101.pptx
@@ -4497,7 +4497,25 @@
           <a:bodyPr/>
           <a:lstStyle/>
           <a:p>
-            <a:endParaRPr lang="en-US" dirty="0"/>
+            <a:r>
+              <a:rPr lang="en-US" dirty="0" smtClean="0"/>
+              <a:t>If you just ran a commit/push to your repo:</a:t>
+            </a:r>
+          </a:p>
+          <a:p>
+            <a:pPr lvl="1"/>
+            <a:r>
+              <a:rPr lang="en-US" dirty="0" err="1" smtClean="0"/>
+              <a:t>git</a:t>
+            </a:r>
+            <a:r>
+              <a:rPr lang="en-US" smtClean="0"/>
+              <a:t> revert HEAD</a:t>
+            </a:r>
+          </a:p>
+          <a:p>
+            <a:pPr lvl="1"/>
+            <a:endParaRPr lang="en-US"/>
           </a:p>
         </p:txBody>
       </p:sp>

</xml_diff>